<commit_message>
dodao prezentacije u pdf formatu
</commit_message>
<xml_diff>
--- a/predavanja/prezentacije/IP01-01-Uvod u racunarske mreze.pptx
+++ b/predavanja/prezentacije/IP01-01-Uvod u racunarske mreze.pptx
@@ -268,7 +268,7 @@
           <a:p>
             <a:fld id="{6B3683FA-0560-4266-A2CA-8A7D404C35FD}" type="datetimeFigureOut">
               <a:rPr lang="en-US" smtClean="0"/>
-              <a:t>10/2/2016</a:t>
+              <a:t>10/22/2018</a:t>
             </a:fld>
             <a:endParaRPr lang="en-US"/>
           </a:p>
@@ -9171,8 +9171,16 @@
               <a:t>komunikacionog kanala preko </a:t>
             </a:r>
             <a:r>
-              <a:rPr lang="sr-Latn-RS" altLang="en-US" dirty="0" smtClean="0"/>
-              <a:t>kojg </a:t>
+              <a:rPr lang="sr-Latn-RS" altLang="en-US" dirty="0" err="1" smtClean="0"/>
+              <a:t>koj</a:t>
+            </a:r>
+            <a:r>
+              <a:rPr lang="en-US" altLang="en-US" smtClean="0"/>
+              <a:t>e</a:t>
+            </a:r>
+            <a:r>
+              <a:rPr lang="sr-Latn-RS" altLang="en-US" smtClean="0"/>
+              <a:t>g </a:t>
             </a:r>
             <a:r>
               <a:rPr lang="sr-Latn-RS" altLang="en-US" dirty="0"/>

</xml_diff>